<commit_message>
Final report last edits
Final report last edits
</commit_message>
<xml_diff>
--- a/40_docs/Presentation Team 8 Opioids.pptx
+++ b/40_docs/Presentation Team 8 Opioids.pptx
@@ -227,7 +227,7 @@
             <a:fld id="{F985A072-61C6-E04D-B874-3CA83C3B7CDA}" type="datetimeFigureOut">
               <a:rPr lang="en-US" smtClean="0"/>
               <a:pPr/>
-              <a:t>11/19/2021</a:t>
+              <a:t>11/21/2021</a:t>
             </a:fld>
             <a:endParaRPr lang="en-US"/>
           </a:p>
@@ -1472,7 +1472,7 @@
             <a:fld id="{345A8FF3-954C-7A44-81B4-F7154A87A48A}" type="datetimeFigureOut">
               <a:rPr lang="en-US" smtClean="0"/>
               <a:pPr/>
-              <a:t>11/19/2021</a:t>
+              <a:t>11/21/2021</a:t>
             </a:fld>
             <a:endParaRPr lang="en-US"/>
           </a:p>
@@ -1640,7 +1640,7 @@
             <a:fld id="{345A8FF3-954C-7A44-81B4-F7154A87A48A}" type="datetimeFigureOut">
               <a:rPr lang="en-US" smtClean="0"/>
               <a:pPr/>
-              <a:t>11/19/2021</a:t>
+              <a:t>11/21/2021</a:t>
             </a:fld>
             <a:endParaRPr lang="en-US"/>
           </a:p>
@@ -1818,7 +1818,7 @@
             <a:fld id="{345A8FF3-954C-7A44-81B4-F7154A87A48A}" type="datetimeFigureOut">
               <a:rPr lang="en-US" smtClean="0"/>
               <a:pPr/>
-              <a:t>11/19/2021</a:t>
+              <a:t>11/21/2021</a:t>
             </a:fld>
             <a:endParaRPr lang="en-US"/>
           </a:p>
@@ -1986,7 +1986,7 @@
             <a:fld id="{345A8FF3-954C-7A44-81B4-F7154A87A48A}" type="datetimeFigureOut">
               <a:rPr lang="en-US" smtClean="0"/>
               <a:pPr/>
-              <a:t>11/19/2021</a:t>
+              <a:t>11/21/2021</a:t>
             </a:fld>
             <a:endParaRPr lang="en-US"/>
           </a:p>
@@ -2231,7 +2231,7 @@
             <a:fld id="{345A8FF3-954C-7A44-81B4-F7154A87A48A}" type="datetimeFigureOut">
               <a:rPr lang="en-US" smtClean="0"/>
               <a:pPr/>
-              <a:t>11/19/2021</a:t>
+              <a:t>11/21/2021</a:t>
             </a:fld>
             <a:endParaRPr lang="en-US"/>
           </a:p>
@@ -2516,7 +2516,7 @@
             <a:fld id="{345A8FF3-954C-7A44-81B4-F7154A87A48A}" type="datetimeFigureOut">
               <a:rPr lang="en-US" smtClean="0"/>
               <a:pPr/>
-              <a:t>11/19/2021</a:t>
+              <a:t>11/21/2021</a:t>
             </a:fld>
             <a:endParaRPr lang="en-US"/>
           </a:p>
@@ -2935,7 +2935,7 @@
             <a:fld id="{345A8FF3-954C-7A44-81B4-F7154A87A48A}" type="datetimeFigureOut">
               <a:rPr lang="en-US" smtClean="0"/>
               <a:pPr/>
-              <a:t>11/19/2021</a:t>
+              <a:t>11/21/2021</a:t>
             </a:fld>
             <a:endParaRPr lang="en-US"/>
           </a:p>
@@ -3052,7 +3052,7 @@
             <a:fld id="{345A8FF3-954C-7A44-81B4-F7154A87A48A}" type="datetimeFigureOut">
               <a:rPr lang="en-US" smtClean="0"/>
               <a:pPr/>
-              <a:t>11/19/2021</a:t>
+              <a:t>11/21/2021</a:t>
             </a:fld>
             <a:endParaRPr lang="en-US"/>
           </a:p>
@@ -3147,7 +3147,7 @@
             <a:fld id="{345A8FF3-954C-7A44-81B4-F7154A87A48A}" type="datetimeFigureOut">
               <a:rPr lang="en-US" smtClean="0"/>
               <a:pPr/>
-              <a:t>11/19/2021</a:t>
+              <a:t>11/21/2021</a:t>
             </a:fld>
             <a:endParaRPr lang="en-US"/>
           </a:p>
@@ -3422,7 +3422,7 @@
             <a:fld id="{345A8FF3-954C-7A44-81B4-F7154A87A48A}" type="datetimeFigureOut">
               <a:rPr lang="en-US" smtClean="0"/>
               <a:pPr/>
-              <a:t>11/19/2021</a:t>
+              <a:t>11/21/2021</a:t>
             </a:fld>
             <a:endParaRPr lang="en-US"/>
           </a:p>
@@ -3674,7 +3674,7 @@
             <a:fld id="{345A8FF3-954C-7A44-81B4-F7154A87A48A}" type="datetimeFigureOut">
               <a:rPr lang="en-US" smtClean="0"/>
               <a:pPr/>
-              <a:t>11/19/2021</a:t>
+              <a:t>11/21/2021</a:t>
             </a:fld>
             <a:endParaRPr lang="en-US"/>
           </a:p>
@@ -3892,7 +3892,7 @@
             <a:fld id="{345A8FF3-954C-7A44-81B4-F7154A87A48A}" type="datetimeFigureOut">
               <a:rPr lang="en-US" smtClean="0"/>
               <a:pPr/>
-              <a:t>11/19/2021</a:t>
+              <a:t>11/21/2021</a:t>
             </a:fld>
             <a:endParaRPr lang="en-US"/>
           </a:p>
@@ -4373,7 +4373,57 @@
                 <a:latin typeface="Arial" panose="020B0604020202020204" pitchFamily="34" charset="0"/>
                 <a:cs typeface="Arial" panose="020B0604020202020204" pitchFamily="34" charset="0"/>
               </a:rPr>
-              <a:t>Opioid shipments Florida and opioid deaths Florida, Texas, Washington</a:t>
+              <a:t>The Impact of Opioid Control Policies – </a:t>
+            </a:r>
+          </a:p>
+          <a:p>
+            <a:pPr lvl="0" algn="ctr" defTabSz="914400" eaLnBrk="0" fontAlgn="base" hangingPunct="0">
+              <a:spcBef>
+                <a:spcPct val="0"/>
+              </a:spcBef>
+              <a:spcAft>
+                <a:spcPct val="0"/>
+              </a:spcAft>
+              <a:defRPr/>
+            </a:pPr>
+            <a:r>
+              <a:rPr kumimoji="0" lang="en-US" sz="2800" b="1" i="0" u="none" strike="noStrike" kern="0" cap="none" spc="0" normalizeH="0" baseline="0" noProof="0" dirty="0">
+                <a:ln>
+                  <a:noFill/>
+                </a:ln>
+                <a:solidFill>
+                  <a:schemeClr val="bg1"/>
+                </a:solidFill>
+                <a:effectLst/>
+                <a:uLnTx/>
+                <a:uFillTx/>
+                <a:latin typeface="Arial" panose="020B0604020202020204" pitchFamily="34" charset="0"/>
+                <a:ea typeface="ＭＳ Ｐゴシック" charset="-128"/>
+                <a:cs typeface="Arial" panose="020B0604020202020204" pitchFamily="34" charset="0"/>
+              </a:rPr>
+              <a:t>Florida, T</a:t>
+            </a:r>
+            <a:r>
+              <a:rPr lang="en-US" sz="2800" b="1" kern="0" dirty="0" err="1">
+                <a:solidFill>
+                  <a:schemeClr val="bg1"/>
+                </a:solidFill>
+                <a:latin typeface="Arial" panose="020B0604020202020204" pitchFamily="34" charset="0"/>
+                <a:ea typeface="ＭＳ Ｐゴシック" charset="-128"/>
+                <a:cs typeface="Arial" panose="020B0604020202020204" pitchFamily="34" charset="0"/>
+              </a:rPr>
+              <a:t>exas</a:t>
+            </a:r>
+            <a:r>
+              <a:rPr lang="en-US" sz="2800" b="1" kern="0" dirty="0">
+                <a:solidFill>
+                  <a:schemeClr val="bg1"/>
+                </a:solidFill>
+                <a:latin typeface="Arial" panose="020B0604020202020204" pitchFamily="34" charset="0"/>
+                <a:ea typeface="ＭＳ Ｐゴシック" charset="-128"/>
+                <a:cs typeface="Arial" panose="020B0604020202020204" pitchFamily="34" charset="0"/>
+              </a:rPr>
+              <a:t>, Washington</a:t>
             </a:r>
             <a:endParaRPr kumimoji="0" lang="en-US" sz="2800" b="1" i="0" u="none" strike="noStrike" kern="0" cap="none" spc="0" normalizeH="0" baseline="0" noProof="0" dirty="0">
               <a:ln>
@@ -4400,7 +4450,7 @@
         </p:nvSpPr>
         <p:spPr>
           <a:xfrm>
-            <a:off x="491952" y="2428088"/>
+            <a:off x="459059" y="2818000"/>
             <a:ext cx="8225881" cy="461665"/>
           </a:xfrm>
           <a:prstGeom prst="rect">
@@ -4572,7 +4622,7 @@
                 <a:ea typeface="ＭＳ Ｐゴシック" charset="-128"/>
                 <a:cs typeface="Helvetica"/>
               </a:rPr>
-              <a:t>Death rates before and after policy changes – comparison states</a:t>
+              <a:t>Shipment rates before and after policy changes – comparison states</a:t>
             </a:r>
           </a:p>
         </p:txBody>
@@ -5983,7 +6033,7 @@
                   <a:schemeClr val="bg1"/>
                 </a:solidFill>
               </a:rPr>
-              <a:t>Assess the effects of policy changes in Florida (2007), Texas (2010) and Washington (2012) on opioid overdose related death rates and opioid shipments.</a:t>
+              <a:t>Assess the effects of policy changes in Florida (2007), Texas (2010) and Washington (2012) on opioid overdose related death rates and opioid shipments in Florida and Washington.</a:t>
             </a:r>
             <a:endParaRPr lang="en-US" sz="3200" dirty="0">
               <a:solidFill>

</xml_diff>